<commit_message>
HTTPS added to URL and changed test_lambda_handler
</commit_message>
<xml_diff>
--- a/Docs/Bias_Score_Analysis/Bias Analisys.pptx
+++ b/Docs/Bias_Score_Analysis/Bias Analisys.pptx
@@ -5,29 +5,30 @@
     <p:sldMasterId id="2147483659" r:id="rId1"/>
   </p:sldMasterIdLst>
   <p:notesMasterIdLst>
-    <p:notesMasterId r:id="rId5"/>
+    <p:notesMasterId r:id="rId6"/>
   </p:notesMasterIdLst>
   <p:sldIdLst>
     <p:sldId id="269" r:id="rId2"/>
     <p:sldId id="270" r:id="rId3"/>
     <p:sldId id="271" r:id="rId4"/>
+    <p:sldId id="272" r:id="rId5"/>
   </p:sldIdLst>
   <p:sldSz cx="9144000" cy="5143500" type="screen16x9"/>
   <p:notesSz cx="6858000" cy="9144000"/>
   <p:embeddedFontLst>
     <p:embeddedFont>
-      <p:font typeface="Raleway" panose="020B0604020202020204" charset="0"/>
-      <p:regular r:id="rId6"/>
-      <p:bold r:id="rId7"/>
-      <p:italic r:id="rId8"/>
-      <p:boldItalic r:id="rId9"/>
+      <p:font typeface="Source Sans Pro" panose="020B0604020202020204" charset="0"/>
+      <p:regular r:id="rId7"/>
+      <p:bold r:id="rId8"/>
+      <p:italic r:id="rId9"/>
+      <p:boldItalic r:id="rId10"/>
     </p:embeddedFont>
     <p:embeddedFont>
-      <p:font typeface="Source Sans Pro" panose="020B0604020202020204" charset="0"/>
-      <p:regular r:id="rId10"/>
-      <p:bold r:id="rId11"/>
-      <p:italic r:id="rId12"/>
-      <p:boldItalic r:id="rId13"/>
+      <p:font typeface="Raleway" panose="020B0604020202020204" charset="0"/>
+      <p:regular r:id="rId11"/>
+      <p:bold r:id="rId12"/>
+      <p:italic r:id="rId13"/>
+      <p:boldItalic r:id="rId14"/>
     </p:embeddedFont>
   </p:embeddedFontLst>
   <p:defaultTextStyle>
@@ -933,6 +934,115 @@
     <p:extLst>
       <p:ext uri="{BB962C8B-B14F-4D97-AF65-F5344CB8AC3E}">
         <p14:creationId xmlns:p14="http://schemas.microsoft.com/office/powerpoint/2010/main" val="1569826673"/>
+      </p:ext>
+    </p:extLst>
+  </p:cSld>
+  <p:clrMapOvr>
+    <a:masterClrMapping/>
+  </p:clrMapOvr>
+</p:notes>
+</file>
+
+<file path=ppt/notesSlides/notesSlide3.xml><?xml version="1.0" encoding="utf-8"?>
+<p:notes xmlns:a="http://schemas.openxmlformats.org/drawingml/2006/main" xmlns:r="http://schemas.openxmlformats.org/officeDocument/2006/relationships" xmlns:p="http://schemas.openxmlformats.org/presentationml/2006/main" showMasterSp="0" showMasterPhAnim="0">
+  <p:cSld>
+    <p:spTree>
+      <p:nvGrpSpPr>
+        <p:cNvPr id="1" name="Shape 119"/>
+        <p:cNvGrpSpPr/>
+        <p:nvPr/>
+      </p:nvGrpSpPr>
+      <p:grpSpPr>
+        <a:xfrm>
+          <a:off x="0" y="0"/>
+          <a:ext cx="0" cy="0"/>
+          <a:chOff x="0" y="0"/>
+          <a:chExt cx="0" cy="0"/>
+        </a:xfrm>
+      </p:grpSpPr>
+      <p:sp>
+        <p:nvSpPr>
+          <p:cNvPr id="120" name="Google Shape;120;g9cbea0de79_0_7:notes"/>
+          <p:cNvSpPr>
+            <a:spLocks noGrp="1" noRot="1" noChangeAspect="1"/>
+          </p:cNvSpPr>
+          <p:nvPr>
+            <p:ph type="sldImg" idx="2"/>
+          </p:nvPr>
+        </p:nvSpPr>
+        <p:spPr>
+          <a:xfrm>
+            <a:off x="381000" y="685800"/>
+            <a:ext cx="6096000" cy="3429000"/>
+          </a:xfrm>
+          <a:custGeom>
+            <a:avLst/>
+            <a:gdLst/>
+            <a:ahLst/>
+            <a:cxnLst/>
+            <a:rect l="l" t="t" r="r" b="b"/>
+            <a:pathLst>
+              <a:path w="120000" h="120000" extrusionOk="0">
+                <a:moveTo>
+                  <a:pt x="0" y="0"/>
+                </a:moveTo>
+                <a:lnTo>
+                  <a:pt x="120000" y="0"/>
+                </a:lnTo>
+                <a:lnTo>
+                  <a:pt x="120000" y="120000"/>
+                </a:lnTo>
+                <a:lnTo>
+                  <a:pt x="0" y="120000"/>
+                </a:lnTo>
+                <a:close/>
+              </a:path>
+            </a:pathLst>
+          </a:custGeom>
+        </p:spPr>
+      </p:sp>
+      <p:sp>
+        <p:nvSpPr>
+          <p:cNvPr id="121" name="Google Shape;121;g9cbea0de79_0_7:notes"/>
+          <p:cNvSpPr txBox="1">
+            <a:spLocks noGrp="1"/>
+          </p:cNvSpPr>
+          <p:nvPr>
+            <p:ph type="body" idx="1"/>
+          </p:nvPr>
+        </p:nvSpPr>
+        <p:spPr>
+          <a:xfrm>
+            <a:off x="685800" y="4343400"/>
+            <a:ext cx="5486400" cy="4114800"/>
+          </a:xfrm>
+          <a:prstGeom prst="rect">
+            <a:avLst/>
+          </a:prstGeom>
+        </p:spPr>
+        <p:txBody>
+          <a:bodyPr spcFirstLastPara="1" wrap="square" lIns="91425" tIns="91425" rIns="91425" bIns="91425" anchor="t" anchorCtr="0">
+            <a:noAutofit/>
+          </a:bodyPr>
+          <a:lstStyle/>
+          <a:p>
+            <a:pPr marL="0" lvl="0" indent="0" algn="l" rtl="0">
+              <a:spcBef>
+                <a:spcPts val="0"/>
+              </a:spcBef>
+              <a:spcAft>
+                <a:spcPts val="0"/>
+              </a:spcAft>
+              <a:buNone/>
+            </a:pPr>
+            <a:endParaRPr/>
+          </a:p>
+        </p:txBody>
+      </p:sp>
+    </p:spTree>
+    <p:extLst>
+      <p:ext uri="{BB962C8B-B14F-4D97-AF65-F5344CB8AC3E}">
+        <p14:creationId xmlns:p14="http://schemas.microsoft.com/office/powerpoint/2010/main" val="1185933593"/>
       </p:ext>
     </p:extLst>
   </p:cSld>
@@ -6442,15 +6552,7 @@
             </a:r>
             <a:r>
               <a:rPr lang="en-GB" sz="1100" dirty="0" smtClean="0"/>
-              <a:t>(*) </a:t>
-            </a:r>
-            <a:r>
-              <a:rPr lang="en-GB" sz="1100" dirty="0" smtClean="0"/>
-              <a:t>Subjectivity varies from 0 </a:t>
-            </a:r>
-            <a:r>
-              <a:rPr lang="en-GB" sz="1100" dirty="0" smtClean="0"/>
-              <a:t>(objective) to 1 (subjective)</a:t>
+              <a:t>(*) Subjectivity varies from 0 (objective) to 1 (subjective)</a:t>
             </a:r>
           </a:p>
           <a:p>
@@ -6799,23 +6901,7 @@
                   <a:srgbClr val="0070C0"/>
                 </a:solidFill>
               </a:rPr>
-              <a:t>(more </a:t>
-            </a:r>
-            <a:r>
-              <a:rPr lang="en-GB" sz="1000" i="1" dirty="0" smtClean="0">
-                <a:solidFill>
-                  <a:srgbClr val="0070C0"/>
-                </a:solidFill>
-              </a:rPr>
-              <a:t>“Biased”</a:t>
-            </a:r>
-            <a:r>
-              <a:rPr lang="en-GB" sz="1000" i="1" dirty="0" smtClean="0">
-                <a:solidFill>
-                  <a:srgbClr val="0070C0"/>
-                </a:solidFill>
-              </a:rPr>
-              <a:t>)</a:t>
+              <a:t>(more “Biased”)</a:t>
             </a:r>
             <a:endParaRPr lang="en-GB" sz="1000" i="1" dirty="0">
               <a:solidFill>
@@ -6853,15 +6939,7 @@
                   <a:srgbClr val="0070C0"/>
                 </a:solidFill>
               </a:rPr>
-              <a:t>(more </a:t>
-            </a:r>
-            <a:r>
-              <a:rPr lang="en-GB" sz="1000" i="1" dirty="0" smtClean="0">
-                <a:solidFill>
-                  <a:srgbClr val="0070C0"/>
-                </a:solidFill>
-              </a:rPr>
-              <a:t>Neutral)</a:t>
+              <a:t>(more Neutral)</a:t>
             </a:r>
             <a:endParaRPr lang="en-GB" sz="1000" i="1" dirty="0">
               <a:solidFill>
@@ -8087,23 +8165,7 @@
                   <a:srgbClr val="0070C0"/>
                 </a:solidFill>
               </a:rPr>
-              <a:t>(more </a:t>
-            </a:r>
-            <a:r>
-              <a:rPr lang="en-GB" sz="1000" i="1" dirty="0" smtClean="0">
-                <a:solidFill>
-                  <a:srgbClr val="0070C0"/>
-                </a:solidFill>
-              </a:rPr>
-              <a:t>“Biased”</a:t>
-            </a:r>
-            <a:r>
-              <a:rPr lang="en-GB" sz="1000" i="1" dirty="0" smtClean="0">
-                <a:solidFill>
-                  <a:srgbClr val="0070C0"/>
-                </a:solidFill>
-              </a:rPr>
-              <a:t>)</a:t>
+              <a:t>(more “Biased”)</a:t>
             </a:r>
             <a:endParaRPr lang="en-GB" sz="1000" i="1" dirty="0">
               <a:solidFill>
@@ -8141,15 +8203,7 @@
                   <a:srgbClr val="0070C0"/>
                 </a:solidFill>
               </a:rPr>
-              <a:t>(more </a:t>
-            </a:r>
-            <a:r>
-              <a:rPr lang="en-GB" sz="1000" i="1" dirty="0" smtClean="0">
-                <a:solidFill>
-                  <a:srgbClr val="0070C0"/>
-                </a:solidFill>
-              </a:rPr>
-              <a:t>Neutral)</a:t>
+              <a:t>(more Neutral)</a:t>
             </a:r>
             <a:endParaRPr lang="en-GB" sz="1000" i="1" dirty="0">
               <a:solidFill>
@@ -8230,6 +8284,1493 @@
   <p:clrMapOvr>
     <a:masterClrMapping/>
   </p:clrMapOvr>
+</p:sld>
+</file>
+
+<file path=ppt/slides/slide4.xml><?xml version="1.0" encoding="utf-8"?>
+<p:sld xmlns:a="http://schemas.openxmlformats.org/drawingml/2006/main" xmlns:r="http://schemas.openxmlformats.org/officeDocument/2006/relationships" xmlns:p="http://schemas.openxmlformats.org/presentationml/2006/main">
+  <p:cSld>
+    <p:spTree>
+      <p:nvGrpSpPr>
+        <p:cNvPr id="1" name="Shape 122"/>
+        <p:cNvGrpSpPr/>
+        <p:nvPr/>
+      </p:nvGrpSpPr>
+      <p:grpSpPr>
+        <a:xfrm>
+          <a:off x="0" y="0"/>
+          <a:ext cx="0" cy="0"/>
+          <a:chOff x="0" y="0"/>
+          <a:chExt cx="0" cy="0"/>
+        </a:xfrm>
+      </p:grpSpPr>
+      <p:sp>
+        <p:nvSpPr>
+          <p:cNvPr id="123" name="Google Shape;123;p20"/>
+          <p:cNvSpPr txBox="1">
+            <a:spLocks noGrp="1"/>
+          </p:cNvSpPr>
+          <p:nvPr>
+            <p:ph type="title"/>
+          </p:nvPr>
+        </p:nvSpPr>
+        <p:spPr>
+          <a:xfrm>
+            <a:off x="1773636" y="218009"/>
+            <a:ext cx="1667463" cy="623400"/>
+          </a:xfrm>
+          <a:prstGeom prst="rect">
+            <a:avLst/>
+          </a:prstGeom>
+        </p:spPr>
+        <p:txBody>
+          <a:bodyPr spcFirstLastPara="1" wrap="square" lIns="91425" tIns="91425" rIns="91425" bIns="91425" anchor="t" anchorCtr="0">
+            <a:noAutofit/>
+          </a:bodyPr>
+          <a:lstStyle/>
+          <a:p>
+            <a:pPr lvl="0"/>
+            <a:r>
+              <a:rPr lang="en" sz="2000" dirty="0" smtClean="0"/>
+              <a:t>Bias Score</a:t>
+            </a:r>
+            <a:br>
+              <a:rPr lang="en" sz="2000" dirty="0" smtClean="0"/>
+            </a:br>
+            <a:endParaRPr sz="2000" dirty="0"/>
+          </a:p>
+        </p:txBody>
+      </p:sp>
+      <p:grpSp>
+        <p:nvGrpSpPr>
+          <p:cNvPr id="13" name="Group 12"/>
+          <p:cNvGrpSpPr/>
+          <p:nvPr/>
+        </p:nvGrpSpPr>
+        <p:grpSpPr>
+          <a:xfrm>
+            <a:off x="234445" y="994632"/>
+            <a:ext cx="5896458" cy="3601375"/>
+            <a:chOff x="440700" y="1200887"/>
+            <a:chExt cx="5896458" cy="3601375"/>
+          </a:xfrm>
+        </p:grpSpPr>
+        <p:cxnSp>
+          <p:nvCxnSpPr>
+            <p:cNvPr id="4" name="Straight Arrow Connector 3"/>
+            <p:cNvCxnSpPr/>
+            <p:nvPr/>
+          </p:nvCxnSpPr>
+          <p:spPr>
+            <a:xfrm flipV="1">
+              <a:off x="1435276" y="4061369"/>
+              <a:ext cx="3104533" cy="2231"/>
+            </a:xfrm>
+            <a:prstGeom prst="straightConnector1">
+              <a:avLst/>
+            </a:prstGeom>
+            <a:ln w="28575">
+              <a:tailEnd type="none"/>
+            </a:ln>
+          </p:spPr>
+          <p:style>
+            <a:lnRef idx="1">
+              <a:schemeClr val="accent1"/>
+            </a:lnRef>
+            <a:fillRef idx="0">
+              <a:schemeClr val="accent1"/>
+            </a:fillRef>
+            <a:effectRef idx="0">
+              <a:schemeClr val="accent1"/>
+            </a:effectRef>
+            <a:fontRef idx="minor">
+              <a:schemeClr val="tx1"/>
+            </a:fontRef>
+          </p:style>
+        </p:cxnSp>
+        <p:cxnSp>
+          <p:nvCxnSpPr>
+            <p:cNvPr id="6" name="Straight Arrow Connector 5"/>
+            <p:cNvCxnSpPr/>
+            <p:nvPr/>
+          </p:nvCxnSpPr>
+          <p:spPr>
+            <a:xfrm flipV="1">
+              <a:off x="1455156" y="1864245"/>
+              <a:ext cx="4885" cy="2192479"/>
+            </a:xfrm>
+            <a:prstGeom prst="straightConnector1">
+              <a:avLst/>
+            </a:prstGeom>
+            <a:ln w="28575">
+              <a:tailEnd type="none"/>
+            </a:ln>
+          </p:spPr>
+          <p:style>
+            <a:lnRef idx="1">
+              <a:schemeClr val="accent1"/>
+            </a:lnRef>
+            <a:fillRef idx="0">
+              <a:schemeClr val="accent1"/>
+            </a:fillRef>
+            <a:effectRef idx="0">
+              <a:schemeClr val="accent1"/>
+            </a:effectRef>
+            <a:fontRef idx="minor">
+              <a:schemeClr val="tx1"/>
+            </a:fontRef>
+          </p:style>
+        </p:cxnSp>
+        <p:sp>
+          <p:nvSpPr>
+            <p:cNvPr id="7" name="TextBox 6"/>
+            <p:cNvSpPr txBox="1"/>
+            <p:nvPr/>
+          </p:nvSpPr>
+          <p:spPr>
+            <a:xfrm>
+              <a:off x="4834824" y="4279042"/>
+              <a:ext cx="1502334" cy="523220"/>
+            </a:xfrm>
+            <a:prstGeom prst="rect">
+              <a:avLst/>
+            </a:prstGeom>
+            <a:noFill/>
+          </p:spPr>
+          <p:txBody>
+            <a:bodyPr wrap="none" rtlCol="0">
+              <a:spAutoFit/>
+            </a:bodyPr>
+            <a:lstStyle/>
+            <a:p>
+              <a:r>
+                <a:rPr lang="en-GB" dirty="0" smtClean="0"/>
+                <a:t>ABS(Pol * Subj) </a:t>
+              </a:r>
+            </a:p>
+            <a:p>
+              <a:r>
+                <a:rPr lang="en-GB" dirty="0" smtClean="0"/>
+                <a:t>of the Article</a:t>
+              </a:r>
+              <a:endParaRPr lang="en-GB" dirty="0"/>
+            </a:p>
+          </p:txBody>
+        </p:sp>
+        <p:sp>
+          <p:nvSpPr>
+            <p:cNvPr id="8" name="TextBox 7"/>
+            <p:cNvSpPr txBox="1"/>
+            <p:nvPr/>
+          </p:nvSpPr>
+          <p:spPr>
+            <a:xfrm>
+              <a:off x="440700" y="1200887"/>
+              <a:ext cx="971741" cy="523220"/>
+            </a:xfrm>
+            <a:prstGeom prst="rect">
+              <a:avLst/>
+            </a:prstGeom>
+            <a:noFill/>
+          </p:spPr>
+          <p:txBody>
+            <a:bodyPr wrap="none" rtlCol="0">
+              <a:spAutoFit/>
+            </a:bodyPr>
+            <a:lstStyle/>
+            <a:p>
+              <a:r>
+                <a:rPr lang="en-GB" dirty="0" smtClean="0"/>
+                <a:t>Website </a:t>
+              </a:r>
+            </a:p>
+            <a:p>
+              <a:r>
+                <a:rPr lang="en-GB" dirty="0" smtClean="0"/>
+                <a:t>Credibility</a:t>
+              </a:r>
+              <a:endParaRPr lang="en-GB" dirty="0"/>
+            </a:p>
+          </p:txBody>
+        </p:sp>
+        <p:cxnSp>
+          <p:nvCxnSpPr>
+            <p:cNvPr id="10" name="Straight Connector 9"/>
+            <p:cNvCxnSpPr/>
+            <p:nvPr/>
+          </p:nvCxnSpPr>
+          <p:spPr>
+            <a:xfrm>
+              <a:off x="1441406" y="1857370"/>
+              <a:ext cx="3075562" cy="6875"/>
+            </a:xfrm>
+            <a:prstGeom prst="line">
+              <a:avLst/>
+            </a:prstGeom>
+            <a:ln>
+              <a:prstDash val="dash"/>
+            </a:ln>
+          </p:spPr>
+          <p:style>
+            <a:lnRef idx="1">
+              <a:schemeClr val="accent1"/>
+            </a:lnRef>
+            <a:fillRef idx="0">
+              <a:schemeClr val="accent1"/>
+            </a:fillRef>
+            <a:effectRef idx="0">
+              <a:schemeClr val="accent1"/>
+            </a:effectRef>
+            <a:fontRef idx="minor">
+              <a:schemeClr val="tx1"/>
+            </a:fontRef>
+          </p:style>
+        </p:cxnSp>
+        <p:sp>
+          <p:nvSpPr>
+            <p:cNvPr id="11" name="TextBox 10"/>
+            <p:cNvSpPr txBox="1"/>
+            <p:nvPr/>
+          </p:nvSpPr>
+          <p:spPr>
+            <a:xfrm>
+              <a:off x="827246" y="1710357"/>
+              <a:ext cx="643125" cy="307777"/>
+            </a:xfrm>
+            <a:prstGeom prst="rect">
+              <a:avLst/>
+            </a:prstGeom>
+            <a:noFill/>
+          </p:spPr>
+          <p:txBody>
+            <a:bodyPr wrap="none" rtlCol="0">
+              <a:spAutoFit/>
+            </a:bodyPr>
+            <a:lstStyle/>
+            <a:p>
+              <a:r>
+                <a:rPr lang="en-GB" dirty="0" smtClean="0"/>
+                <a:t>100%</a:t>
+              </a:r>
+              <a:endParaRPr lang="en-GB" dirty="0"/>
+            </a:p>
+          </p:txBody>
+        </p:sp>
+        <p:sp>
+          <p:nvSpPr>
+            <p:cNvPr id="16" name="TextBox 15"/>
+            <p:cNvSpPr txBox="1"/>
+            <p:nvPr/>
+          </p:nvSpPr>
+          <p:spPr>
+            <a:xfrm>
+              <a:off x="868496" y="2729651"/>
+              <a:ext cx="543739" cy="307777"/>
+            </a:xfrm>
+            <a:prstGeom prst="rect">
+              <a:avLst/>
+            </a:prstGeom>
+            <a:noFill/>
+          </p:spPr>
+          <p:txBody>
+            <a:bodyPr wrap="none" rtlCol="0">
+              <a:spAutoFit/>
+            </a:bodyPr>
+            <a:lstStyle/>
+            <a:p>
+              <a:r>
+                <a:rPr lang="en-GB" dirty="0"/>
+                <a:t>5</a:t>
+              </a:r>
+              <a:r>
+                <a:rPr lang="en-GB" dirty="0" smtClean="0"/>
+                <a:t>0%</a:t>
+              </a:r>
+              <a:endParaRPr lang="en-GB" dirty="0"/>
+            </a:p>
+          </p:txBody>
+        </p:sp>
+        <p:sp>
+          <p:nvSpPr>
+            <p:cNvPr id="17" name="TextBox 16"/>
+            <p:cNvSpPr txBox="1"/>
+            <p:nvPr/>
+          </p:nvSpPr>
+          <p:spPr>
+            <a:xfrm>
+              <a:off x="1270415" y="4125154"/>
+              <a:ext cx="284052" cy="307777"/>
+            </a:xfrm>
+            <a:prstGeom prst="rect">
+              <a:avLst/>
+            </a:prstGeom>
+            <a:noFill/>
+          </p:spPr>
+          <p:txBody>
+            <a:bodyPr wrap="none" rtlCol="0">
+              <a:spAutoFit/>
+            </a:bodyPr>
+            <a:lstStyle/>
+            <a:p>
+              <a:r>
+                <a:rPr lang="en-GB" dirty="0" smtClean="0"/>
+                <a:t>0</a:t>
+              </a:r>
+              <a:endParaRPr lang="en-GB" dirty="0"/>
+            </a:p>
+          </p:txBody>
+        </p:sp>
+        <p:sp>
+          <p:nvSpPr>
+            <p:cNvPr id="18" name="TextBox 17"/>
+            <p:cNvSpPr txBox="1"/>
+            <p:nvPr/>
+          </p:nvSpPr>
+          <p:spPr>
+            <a:xfrm>
+              <a:off x="977031" y="3817377"/>
+              <a:ext cx="444352" cy="307777"/>
+            </a:xfrm>
+            <a:prstGeom prst="rect">
+              <a:avLst/>
+            </a:prstGeom>
+            <a:noFill/>
+          </p:spPr>
+          <p:txBody>
+            <a:bodyPr wrap="none" rtlCol="0">
+              <a:spAutoFit/>
+            </a:bodyPr>
+            <a:lstStyle/>
+            <a:p>
+              <a:r>
+                <a:rPr lang="en-GB" dirty="0" smtClean="0"/>
+                <a:t>0%</a:t>
+              </a:r>
+              <a:endParaRPr lang="en-GB" dirty="0"/>
+            </a:p>
+          </p:txBody>
+        </p:sp>
+        <p:sp>
+          <p:nvSpPr>
+            <p:cNvPr id="12" name="TextBox 11"/>
+            <p:cNvSpPr txBox="1"/>
+            <p:nvPr/>
+          </p:nvSpPr>
+          <p:spPr>
+            <a:xfrm>
+              <a:off x="2757080" y="4125154"/>
+              <a:ext cx="433132" cy="307777"/>
+            </a:xfrm>
+            <a:prstGeom prst="rect">
+              <a:avLst/>
+            </a:prstGeom>
+            <a:noFill/>
+          </p:spPr>
+          <p:txBody>
+            <a:bodyPr wrap="none" rtlCol="0">
+              <a:spAutoFit/>
+            </a:bodyPr>
+            <a:lstStyle/>
+            <a:p>
+              <a:r>
+                <a:rPr lang="en-GB" dirty="0" smtClean="0"/>
+                <a:t>0.5</a:t>
+              </a:r>
+              <a:endParaRPr lang="en-GB" dirty="0"/>
+            </a:p>
+          </p:txBody>
+        </p:sp>
+        <p:cxnSp>
+          <p:nvCxnSpPr>
+            <p:cNvPr id="20" name="Straight Connector 19"/>
+            <p:cNvCxnSpPr/>
+            <p:nvPr/>
+          </p:nvCxnSpPr>
+          <p:spPr>
+            <a:xfrm>
+              <a:off x="1434530" y="2883539"/>
+              <a:ext cx="3095913" cy="0"/>
+            </a:xfrm>
+            <a:prstGeom prst="line">
+              <a:avLst/>
+            </a:prstGeom>
+            <a:ln>
+              <a:prstDash val="dash"/>
+            </a:ln>
+          </p:spPr>
+          <p:style>
+            <a:lnRef idx="1">
+              <a:schemeClr val="accent1"/>
+            </a:lnRef>
+            <a:fillRef idx="0">
+              <a:schemeClr val="accent1"/>
+            </a:fillRef>
+            <a:effectRef idx="0">
+              <a:schemeClr val="accent1"/>
+            </a:effectRef>
+            <a:fontRef idx="minor">
+              <a:schemeClr val="tx1"/>
+            </a:fontRef>
+          </p:style>
+        </p:cxnSp>
+        <p:cxnSp>
+          <p:nvCxnSpPr>
+            <p:cNvPr id="21" name="Straight Connector 20"/>
+            <p:cNvCxnSpPr/>
+            <p:nvPr/>
+          </p:nvCxnSpPr>
+          <p:spPr>
+            <a:xfrm flipV="1">
+              <a:off x="2999947" y="1869761"/>
+              <a:ext cx="5730" cy="2206233"/>
+            </a:xfrm>
+            <a:prstGeom prst="line">
+              <a:avLst/>
+            </a:prstGeom>
+            <a:ln>
+              <a:prstDash val="dash"/>
+            </a:ln>
+          </p:spPr>
+          <p:style>
+            <a:lnRef idx="1">
+              <a:schemeClr val="accent1"/>
+            </a:lnRef>
+            <a:fillRef idx="0">
+              <a:schemeClr val="accent1"/>
+            </a:fillRef>
+            <a:effectRef idx="0">
+              <a:schemeClr val="accent1"/>
+            </a:effectRef>
+            <a:fontRef idx="minor">
+              <a:schemeClr val="tx1"/>
+            </a:fontRef>
+          </p:style>
+        </p:cxnSp>
+        <p:sp>
+          <p:nvSpPr>
+            <p:cNvPr id="19" name="TextBox 18"/>
+            <p:cNvSpPr txBox="1"/>
+            <p:nvPr/>
+          </p:nvSpPr>
+          <p:spPr>
+            <a:xfrm>
+              <a:off x="4374942" y="4094644"/>
+              <a:ext cx="284052" cy="307777"/>
+            </a:xfrm>
+            <a:prstGeom prst="rect">
+              <a:avLst/>
+            </a:prstGeom>
+            <a:noFill/>
+          </p:spPr>
+          <p:txBody>
+            <a:bodyPr wrap="none" rtlCol="0">
+              <a:spAutoFit/>
+            </a:bodyPr>
+            <a:lstStyle/>
+            <a:p>
+              <a:r>
+                <a:rPr lang="en-GB" dirty="0" smtClean="0"/>
+                <a:t>1</a:t>
+              </a:r>
+              <a:endParaRPr lang="en-GB" dirty="0"/>
+            </a:p>
+          </p:txBody>
+        </p:sp>
+        <p:sp>
+          <p:nvSpPr>
+            <p:cNvPr id="28" name="TextBox 27"/>
+            <p:cNvSpPr txBox="1"/>
+            <p:nvPr/>
+          </p:nvSpPr>
+          <p:spPr>
+            <a:xfrm>
+              <a:off x="898555" y="2191458"/>
+              <a:ext cx="543739" cy="307777"/>
+            </a:xfrm>
+            <a:prstGeom prst="rect">
+              <a:avLst/>
+            </a:prstGeom>
+            <a:noFill/>
+          </p:spPr>
+          <p:txBody>
+            <a:bodyPr wrap="none" rtlCol="0">
+              <a:spAutoFit/>
+            </a:bodyPr>
+            <a:lstStyle/>
+            <a:p>
+              <a:r>
+                <a:rPr lang="en-GB" dirty="0" smtClean="0"/>
+                <a:t>75%</a:t>
+              </a:r>
+              <a:endParaRPr lang="en-GB" dirty="0"/>
+            </a:p>
+          </p:txBody>
+        </p:sp>
+        <p:cxnSp>
+          <p:nvCxnSpPr>
+            <p:cNvPr id="33" name="Straight Connector 32"/>
+            <p:cNvCxnSpPr/>
+            <p:nvPr/>
+          </p:nvCxnSpPr>
+          <p:spPr>
+            <a:xfrm>
+              <a:off x="1412235" y="2394341"/>
+              <a:ext cx="3075562" cy="6875"/>
+            </a:xfrm>
+            <a:prstGeom prst="line">
+              <a:avLst/>
+            </a:prstGeom>
+            <a:ln>
+              <a:prstDash val="dash"/>
+            </a:ln>
+          </p:spPr>
+          <p:style>
+            <a:lnRef idx="1">
+              <a:schemeClr val="accent1"/>
+            </a:lnRef>
+            <a:fillRef idx="0">
+              <a:schemeClr val="accent1"/>
+            </a:fillRef>
+            <a:effectRef idx="0">
+              <a:schemeClr val="accent1"/>
+            </a:effectRef>
+            <a:fontRef idx="minor">
+              <a:schemeClr val="tx1"/>
+            </a:fontRef>
+          </p:style>
+        </p:cxnSp>
+        <p:sp>
+          <p:nvSpPr>
+            <p:cNvPr id="30" name="Rectangle 29"/>
+            <p:cNvSpPr/>
+            <p:nvPr/>
+          </p:nvSpPr>
+          <p:spPr>
+            <a:xfrm>
+              <a:off x="1469670" y="1864245"/>
+              <a:ext cx="3055262" cy="530096"/>
+            </a:xfrm>
+            <a:prstGeom prst="rect">
+              <a:avLst/>
+            </a:prstGeom>
+            <a:solidFill>
+              <a:srgbClr val="CDFFE4"/>
+            </a:solidFill>
+            <a:ln>
+              <a:solidFill>
+                <a:srgbClr val="00B050"/>
+              </a:solidFill>
+            </a:ln>
+          </p:spPr>
+          <p:style>
+            <a:lnRef idx="2">
+              <a:schemeClr val="accent1">
+                <a:shade val="50000"/>
+              </a:schemeClr>
+            </a:lnRef>
+            <a:fillRef idx="1">
+              <a:schemeClr val="accent1"/>
+            </a:fillRef>
+            <a:effectRef idx="0">
+              <a:schemeClr val="accent1"/>
+            </a:effectRef>
+            <a:fontRef idx="minor">
+              <a:schemeClr val="lt1"/>
+            </a:fontRef>
+          </p:style>
+          <p:txBody>
+            <a:bodyPr rtlCol="0" anchor="ctr"/>
+            <a:lstStyle/>
+            <a:p>
+              <a:pPr algn="ctr"/>
+              <a:endParaRPr lang="en-GB"/>
+            </a:p>
+          </p:txBody>
+        </p:sp>
+        <p:sp>
+          <p:nvSpPr>
+            <p:cNvPr id="36" name="Rectangle 35"/>
+            <p:cNvSpPr/>
+            <p:nvPr/>
+          </p:nvSpPr>
+          <p:spPr>
+            <a:xfrm>
+              <a:off x="1469670" y="2425172"/>
+              <a:ext cx="3055262" cy="530096"/>
+            </a:xfrm>
+            <a:prstGeom prst="rect">
+              <a:avLst/>
+            </a:prstGeom>
+            <a:solidFill>
+              <a:srgbClr val="FFFFC9"/>
+            </a:solidFill>
+            <a:ln>
+              <a:solidFill>
+                <a:srgbClr val="FFFF00"/>
+              </a:solidFill>
+            </a:ln>
+          </p:spPr>
+          <p:style>
+            <a:lnRef idx="2">
+              <a:schemeClr val="accent1">
+                <a:shade val="50000"/>
+              </a:schemeClr>
+            </a:lnRef>
+            <a:fillRef idx="1">
+              <a:schemeClr val="accent1"/>
+            </a:fillRef>
+            <a:effectRef idx="0">
+              <a:schemeClr val="accent1"/>
+            </a:effectRef>
+            <a:fontRef idx="minor">
+              <a:schemeClr val="lt1"/>
+            </a:fontRef>
+          </p:style>
+          <p:txBody>
+            <a:bodyPr rtlCol="0" anchor="ctr"/>
+            <a:lstStyle/>
+            <a:p>
+              <a:pPr algn="ctr"/>
+              <a:endParaRPr lang="en-GB"/>
+            </a:p>
+          </p:txBody>
+        </p:sp>
+        <p:sp>
+          <p:nvSpPr>
+            <p:cNvPr id="37" name="Rectangle 36"/>
+            <p:cNvSpPr/>
+            <p:nvPr/>
+          </p:nvSpPr>
+          <p:spPr>
+            <a:xfrm>
+              <a:off x="1476927" y="2985624"/>
+              <a:ext cx="3055262" cy="1054864"/>
+            </a:xfrm>
+            <a:prstGeom prst="rect">
+              <a:avLst/>
+            </a:prstGeom>
+            <a:solidFill>
+              <a:srgbClr val="FFAFAF"/>
+            </a:solidFill>
+            <a:ln>
+              <a:solidFill>
+                <a:srgbClr val="FF0000"/>
+              </a:solidFill>
+            </a:ln>
+          </p:spPr>
+          <p:style>
+            <a:lnRef idx="2">
+              <a:schemeClr val="accent1">
+                <a:shade val="50000"/>
+              </a:schemeClr>
+            </a:lnRef>
+            <a:fillRef idx="1">
+              <a:schemeClr val="accent1"/>
+            </a:fillRef>
+            <a:effectRef idx="0">
+              <a:schemeClr val="accent1"/>
+            </a:effectRef>
+            <a:fontRef idx="minor">
+              <a:schemeClr val="lt1"/>
+            </a:fontRef>
+          </p:style>
+          <p:txBody>
+            <a:bodyPr rtlCol="0" anchor="ctr"/>
+            <a:lstStyle/>
+            <a:p>
+              <a:pPr algn="ctr"/>
+              <a:endParaRPr lang="en-GB"/>
+            </a:p>
+          </p:txBody>
+        </p:sp>
+        <p:cxnSp>
+          <p:nvCxnSpPr>
+            <p:cNvPr id="26" name="Straight Connector 25"/>
+            <p:cNvCxnSpPr/>
+            <p:nvPr/>
+          </p:nvCxnSpPr>
+          <p:spPr>
+            <a:xfrm flipV="1">
+              <a:off x="4530978" y="1870341"/>
+              <a:ext cx="0" cy="2186962"/>
+            </a:xfrm>
+            <a:prstGeom prst="line">
+              <a:avLst/>
+            </a:prstGeom>
+            <a:ln w="25400">
+              <a:prstDash val="dash"/>
+            </a:ln>
+          </p:spPr>
+          <p:style>
+            <a:lnRef idx="1">
+              <a:schemeClr val="accent1"/>
+            </a:lnRef>
+            <a:fillRef idx="0">
+              <a:schemeClr val="accent1"/>
+            </a:fillRef>
+            <a:effectRef idx="0">
+              <a:schemeClr val="accent1"/>
+            </a:effectRef>
+            <a:fontRef idx="minor">
+              <a:schemeClr val="tx1"/>
+            </a:fontRef>
+          </p:style>
+        </p:cxnSp>
+        <p:cxnSp>
+          <p:nvCxnSpPr>
+            <p:cNvPr id="39" name="Straight Connector 38"/>
+            <p:cNvCxnSpPr/>
+            <p:nvPr/>
+          </p:nvCxnSpPr>
+          <p:spPr>
+            <a:xfrm flipV="1">
+              <a:off x="2994016" y="1847430"/>
+              <a:ext cx="0" cy="2186962"/>
+            </a:xfrm>
+            <a:prstGeom prst="line">
+              <a:avLst/>
+            </a:prstGeom>
+            <a:ln w="25400">
+              <a:prstDash val="dash"/>
+            </a:ln>
+          </p:spPr>
+          <p:style>
+            <a:lnRef idx="1">
+              <a:schemeClr val="accent1"/>
+            </a:lnRef>
+            <a:fillRef idx="0">
+              <a:schemeClr val="accent1"/>
+            </a:fillRef>
+            <a:effectRef idx="0">
+              <a:schemeClr val="accent1"/>
+            </a:effectRef>
+            <a:fontRef idx="minor">
+              <a:schemeClr val="tx1"/>
+            </a:fontRef>
+          </p:style>
+        </p:cxnSp>
+        <p:cxnSp>
+          <p:nvCxnSpPr>
+            <p:cNvPr id="34" name="Straight Connector 33"/>
+            <p:cNvCxnSpPr>
+              <a:stCxn id="11" idx="3"/>
+            </p:cNvCxnSpPr>
+            <p:nvPr/>
+          </p:nvCxnSpPr>
+          <p:spPr>
+            <a:xfrm flipV="1">
+              <a:off x="1470371" y="1864245"/>
+              <a:ext cx="3061818" cy="1"/>
+            </a:xfrm>
+            <a:prstGeom prst="line">
+              <a:avLst/>
+            </a:prstGeom>
+            <a:ln w="25400">
+              <a:prstDash val="dash"/>
+            </a:ln>
+          </p:spPr>
+          <p:style>
+            <a:lnRef idx="1">
+              <a:schemeClr val="accent1"/>
+            </a:lnRef>
+            <a:fillRef idx="0">
+              <a:schemeClr val="accent1"/>
+            </a:fillRef>
+            <a:effectRef idx="0">
+              <a:schemeClr val="accent1"/>
+            </a:effectRef>
+            <a:fontRef idx="minor">
+              <a:schemeClr val="tx1"/>
+            </a:fontRef>
+          </p:style>
+        </p:cxnSp>
+        <p:cxnSp>
+          <p:nvCxnSpPr>
+            <p:cNvPr id="42" name="Straight Connector 41"/>
+            <p:cNvCxnSpPr/>
+            <p:nvPr/>
+          </p:nvCxnSpPr>
+          <p:spPr>
+            <a:xfrm flipV="1">
+              <a:off x="1470371" y="2961044"/>
+              <a:ext cx="3061818" cy="1"/>
+            </a:xfrm>
+            <a:prstGeom prst="line">
+              <a:avLst/>
+            </a:prstGeom>
+            <a:ln w="25400">
+              <a:prstDash val="dash"/>
+            </a:ln>
+          </p:spPr>
+          <p:style>
+            <a:lnRef idx="1">
+              <a:schemeClr val="accent1"/>
+            </a:lnRef>
+            <a:fillRef idx="0">
+              <a:schemeClr val="accent1"/>
+            </a:fillRef>
+            <a:effectRef idx="0">
+              <a:schemeClr val="accent1"/>
+            </a:effectRef>
+            <a:fontRef idx="minor">
+              <a:schemeClr val="tx1"/>
+            </a:fontRef>
+          </p:style>
+        </p:cxnSp>
+        <p:cxnSp>
+          <p:nvCxnSpPr>
+            <p:cNvPr id="41" name="Straight Connector 40"/>
+            <p:cNvCxnSpPr/>
+            <p:nvPr/>
+          </p:nvCxnSpPr>
+          <p:spPr>
+            <a:xfrm>
+              <a:off x="2200656" y="4078224"/>
+              <a:ext cx="0" cy="0"/>
+            </a:xfrm>
+            <a:prstGeom prst="line">
+              <a:avLst/>
+            </a:prstGeom>
+          </p:spPr>
+          <p:style>
+            <a:lnRef idx="1">
+              <a:schemeClr val="accent1"/>
+            </a:lnRef>
+            <a:fillRef idx="0">
+              <a:schemeClr val="accent1"/>
+            </a:fillRef>
+            <a:effectRef idx="0">
+              <a:schemeClr val="accent1"/>
+            </a:effectRef>
+            <a:fontRef idx="minor">
+              <a:schemeClr val="tx1"/>
+            </a:fontRef>
+          </p:style>
+        </p:cxnSp>
+        <p:cxnSp>
+          <p:nvCxnSpPr>
+            <p:cNvPr id="47" name="Straight Connector 46"/>
+            <p:cNvCxnSpPr/>
+            <p:nvPr/>
+          </p:nvCxnSpPr>
+          <p:spPr>
+            <a:xfrm>
+              <a:off x="1531833" y="1688884"/>
+              <a:ext cx="26711" cy="2462112"/>
+            </a:xfrm>
+            <a:prstGeom prst="line">
+              <a:avLst/>
+            </a:prstGeom>
+            <a:ln>
+              <a:solidFill>
+                <a:schemeClr val="tx1">
+                  <a:lumMod val="60000"/>
+                  <a:lumOff val="40000"/>
+                </a:schemeClr>
+              </a:solidFill>
+              <a:prstDash val="sysDot"/>
+            </a:ln>
+          </p:spPr>
+          <p:style>
+            <a:lnRef idx="1">
+              <a:schemeClr val="accent1"/>
+            </a:lnRef>
+            <a:fillRef idx="0">
+              <a:schemeClr val="accent1"/>
+            </a:fillRef>
+            <a:effectRef idx="0">
+              <a:schemeClr val="accent1"/>
+            </a:effectRef>
+            <a:fontRef idx="minor">
+              <a:schemeClr val="tx1"/>
+            </a:fontRef>
+          </p:style>
+        </p:cxnSp>
+        <p:cxnSp>
+          <p:nvCxnSpPr>
+            <p:cNvPr id="51" name="Straight Connector 50"/>
+            <p:cNvCxnSpPr/>
+            <p:nvPr/>
+          </p:nvCxnSpPr>
+          <p:spPr>
+            <a:xfrm flipV="1">
+              <a:off x="1412235" y="2011327"/>
+              <a:ext cx="3246759" cy="1"/>
+            </a:xfrm>
+            <a:prstGeom prst="line">
+              <a:avLst/>
+            </a:prstGeom>
+            <a:ln>
+              <a:solidFill>
+                <a:schemeClr val="tx1">
+                  <a:lumMod val="60000"/>
+                  <a:lumOff val="40000"/>
+                </a:schemeClr>
+              </a:solidFill>
+              <a:prstDash val="sysDot"/>
+            </a:ln>
+          </p:spPr>
+          <p:style>
+            <a:lnRef idx="1">
+              <a:schemeClr val="accent1"/>
+            </a:lnRef>
+            <a:fillRef idx="0">
+              <a:schemeClr val="accent1"/>
+            </a:fillRef>
+            <a:effectRef idx="0">
+              <a:schemeClr val="accent1"/>
+            </a:effectRef>
+            <a:fontRef idx="minor">
+              <a:schemeClr val="tx1"/>
+            </a:fontRef>
+          </p:style>
+        </p:cxnSp>
+        <p:sp>
+          <p:nvSpPr>
+            <p:cNvPr id="56" name="TextBox 55"/>
+            <p:cNvSpPr txBox="1"/>
+            <p:nvPr/>
+          </p:nvSpPr>
+          <p:spPr>
+            <a:xfrm>
+              <a:off x="1066658" y="1939461"/>
+              <a:ext cx="566928" cy="246221"/>
+            </a:xfrm>
+            <a:prstGeom prst="rect">
+              <a:avLst/>
+            </a:prstGeom>
+            <a:noFill/>
+          </p:spPr>
+          <p:txBody>
+            <a:bodyPr wrap="square" rtlCol="0">
+              <a:spAutoFit/>
+            </a:bodyPr>
+            <a:lstStyle/>
+            <a:p>
+              <a:r>
+                <a:rPr lang="en-GB" sz="1000" dirty="0">
+                  <a:solidFill>
+                    <a:schemeClr val="tx1">
+                      <a:lumMod val="60000"/>
+                      <a:lumOff val="40000"/>
+                    </a:schemeClr>
+                  </a:solidFill>
+                </a:rPr>
+                <a:t>9</a:t>
+              </a:r>
+              <a:r>
+                <a:rPr lang="en-GB" sz="1000" dirty="0" smtClean="0">
+                  <a:solidFill>
+                    <a:schemeClr val="tx1">
+                      <a:lumMod val="60000"/>
+                      <a:lumOff val="40000"/>
+                    </a:schemeClr>
+                  </a:solidFill>
+                </a:rPr>
+                <a:t>5%</a:t>
+              </a:r>
+              <a:endParaRPr lang="en-GB" sz="1000" dirty="0">
+                <a:solidFill>
+                  <a:schemeClr val="tx1">
+                    <a:lumMod val="60000"/>
+                    <a:lumOff val="40000"/>
+                  </a:schemeClr>
+                </a:solidFill>
+              </a:endParaRPr>
+            </a:p>
+          </p:txBody>
+        </p:sp>
+        <p:sp>
+          <p:nvSpPr>
+            <p:cNvPr id="58" name="TextBox 57"/>
+            <p:cNvSpPr txBox="1"/>
+            <p:nvPr/>
+          </p:nvSpPr>
+          <p:spPr>
+            <a:xfrm>
+              <a:off x="1383661" y="1855610"/>
+              <a:ext cx="356188" cy="400110"/>
+            </a:xfrm>
+            <a:prstGeom prst="rect">
+              <a:avLst/>
+            </a:prstGeom>
+            <a:noFill/>
+          </p:spPr>
+          <p:txBody>
+            <a:bodyPr wrap="none" rtlCol="0">
+              <a:spAutoFit/>
+            </a:bodyPr>
+            <a:lstStyle/>
+            <a:p>
+              <a:r>
+                <a:rPr lang="en-GB" sz="2000" b="1" dirty="0" smtClean="0"/>
+                <a:t>X</a:t>
+              </a:r>
+              <a:endParaRPr lang="en-GB" sz="2000" b="1" dirty="0"/>
+            </a:p>
+          </p:txBody>
+        </p:sp>
+        <p:sp>
+          <p:nvSpPr>
+            <p:cNvPr id="35" name="TextBox 34"/>
+            <p:cNvSpPr txBox="1"/>
+            <p:nvPr/>
+          </p:nvSpPr>
+          <p:spPr>
+            <a:xfrm>
+              <a:off x="3820142" y="4392559"/>
+              <a:ext cx="1109599" cy="246221"/>
+            </a:xfrm>
+            <a:prstGeom prst="rect">
+              <a:avLst/>
+            </a:prstGeom>
+            <a:noFill/>
+          </p:spPr>
+          <p:txBody>
+            <a:bodyPr wrap="none" rtlCol="0">
+              <a:spAutoFit/>
+            </a:bodyPr>
+            <a:lstStyle/>
+            <a:p>
+              <a:r>
+                <a:rPr lang="en-GB" sz="1000" i="1" dirty="0" smtClean="0">
+                  <a:solidFill>
+                    <a:srgbClr val="0070C0"/>
+                  </a:solidFill>
+                </a:rPr>
+                <a:t>(more “Biased”)</a:t>
+              </a:r>
+              <a:endParaRPr lang="en-GB" sz="1000" i="1" dirty="0">
+                <a:solidFill>
+                  <a:srgbClr val="0070C0"/>
+                </a:solidFill>
+              </a:endParaRPr>
+            </a:p>
+          </p:txBody>
+        </p:sp>
+        <p:sp>
+          <p:nvSpPr>
+            <p:cNvPr id="38" name="TextBox 37"/>
+            <p:cNvSpPr txBox="1"/>
+            <p:nvPr/>
+          </p:nvSpPr>
+          <p:spPr>
+            <a:xfrm>
+              <a:off x="1056649" y="4399274"/>
+              <a:ext cx="1010213" cy="246221"/>
+            </a:xfrm>
+            <a:prstGeom prst="rect">
+              <a:avLst/>
+            </a:prstGeom>
+            <a:noFill/>
+          </p:spPr>
+          <p:txBody>
+            <a:bodyPr wrap="none" rtlCol="0">
+              <a:spAutoFit/>
+            </a:bodyPr>
+            <a:lstStyle/>
+            <a:p>
+              <a:r>
+                <a:rPr lang="en-GB" sz="1000" i="1" dirty="0" smtClean="0">
+                  <a:solidFill>
+                    <a:srgbClr val="0070C0"/>
+                  </a:solidFill>
+                </a:rPr>
+                <a:t>(more Neutral)</a:t>
+              </a:r>
+              <a:endParaRPr lang="en-GB" sz="1000" i="1" dirty="0">
+                <a:solidFill>
+                  <a:srgbClr val="0070C0"/>
+                </a:solidFill>
+              </a:endParaRPr>
+            </a:p>
+          </p:txBody>
+        </p:sp>
+        <p:sp>
+          <p:nvSpPr>
+            <p:cNvPr id="3" name="TextBox 2"/>
+            <p:cNvSpPr txBox="1"/>
+            <p:nvPr/>
+          </p:nvSpPr>
+          <p:spPr>
+            <a:xfrm>
+              <a:off x="1559319" y="1950998"/>
+              <a:ext cx="500458" cy="276999"/>
+            </a:xfrm>
+            <a:prstGeom prst="rect">
+              <a:avLst/>
+            </a:prstGeom>
+            <a:noFill/>
+          </p:spPr>
+          <p:txBody>
+            <a:bodyPr wrap="none" rtlCol="0">
+              <a:spAutoFit/>
+            </a:bodyPr>
+            <a:lstStyle/>
+            <a:p>
+              <a:r>
+                <a:rPr lang="en-GB" sz="1200" dirty="0" smtClean="0"/>
+                <a:t>BBC</a:t>
+              </a:r>
+              <a:endParaRPr lang="en-GB" sz="1200" dirty="0"/>
+            </a:p>
+          </p:txBody>
+        </p:sp>
+        <p:cxnSp>
+          <p:nvCxnSpPr>
+            <p:cNvPr id="49" name="Straight Connector 48"/>
+            <p:cNvCxnSpPr/>
+            <p:nvPr/>
+          </p:nvCxnSpPr>
+          <p:spPr>
+            <a:xfrm>
+              <a:off x="1521673" y="1688884"/>
+              <a:ext cx="26711" cy="2462112"/>
+            </a:xfrm>
+            <a:prstGeom prst="line">
+              <a:avLst/>
+            </a:prstGeom>
+            <a:ln>
+              <a:solidFill>
+                <a:schemeClr val="tx1">
+                  <a:lumMod val="60000"/>
+                  <a:lumOff val="40000"/>
+                </a:schemeClr>
+              </a:solidFill>
+              <a:prstDash val="sysDot"/>
+            </a:ln>
+          </p:spPr>
+          <p:style>
+            <a:lnRef idx="1">
+              <a:schemeClr val="accent1"/>
+            </a:lnRef>
+            <a:fillRef idx="0">
+              <a:schemeClr val="accent1"/>
+            </a:fillRef>
+            <a:effectRef idx="0">
+              <a:schemeClr val="accent1"/>
+            </a:effectRef>
+            <a:fontRef idx="minor">
+              <a:schemeClr val="tx1"/>
+            </a:fontRef>
+          </p:style>
+        </p:cxnSp>
+        <p:cxnSp>
+          <p:nvCxnSpPr>
+            <p:cNvPr id="52" name="Straight Connector 51"/>
+            <p:cNvCxnSpPr/>
+            <p:nvPr/>
+          </p:nvCxnSpPr>
+          <p:spPr>
+            <a:xfrm flipV="1">
+              <a:off x="1412235" y="3017651"/>
+              <a:ext cx="3246759" cy="1"/>
+            </a:xfrm>
+            <a:prstGeom prst="line">
+              <a:avLst/>
+            </a:prstGeom>
+            <a:ln>
+              <a:solidFill>
+                <a:schemeClr val="tx1">
+                  <a:lumMod val="60000"/>
+                  <a:lumOff val="40000"/>
+                </a:schemeClr>
+              </a:solidFill>
+              <a:prstDash val="sysDot"/>
+            </a:ln>
+          </p:spPr>
+          <p:style>
+            <a:lnRef idx="1">
+              <a:schemeClr val="accent1"/>
+            </a:lnRef>
+            <a:fillRef idx="0">
+              <a:schemeClr val="accent1"/>
+            </a:fillRef>
+            <a:effectRef idx="0">
+              <a:schemeClr val="accent1"/>
+            </a:effectRef>
+            <a:fontRef idx="minor">
+              <a:schemeClr val="tx1"/>
+            </a:fontRef>
+          </p:style>
+        </p:cxnSp>
+        <p:sp>
+          <p:nvSpPr>
+            <p:cNvPr id="53" name="TextBox 52"/>
+            <p:cNvSpPr txBox="1"/>
+            <p:nvPr/>
+          </p:nvSpPr>
+          <p:spPr>
+            <a:xfrm>
+              <a:off x="966340" y="2955053"/>
+              <a:ext cx="566928" cy="246221"/>
+            </a:xfrm>
+            <a:prstGeom prst="rect">
+              <a:avLst/>
+            </a:prstGeom>
+            <a:noFill/>
+          </p:spPr>
+          <p:txBody>
+            <a:bodyPr wrap="square" rtlCol="0">
+              <a:spAutoFit/>
+            </a:bodyPr>
+            <a:lstStyle/>
+            <a:p>
+              <a:r>
+                <a:rPr lang="en-GB" sz="1000" dirty="0">
+                  <a:solidFill>
+                    <a:schemeClr val="tx1">
+                      <a:lumMod val="60000"/>
+                      <a:lumOff val="40000"/>
+                    </a:schemeClr>
+                  </a:solidFill>
+                </a:rPr>
+                <a:t>49.5</a:t>
+              </a:r>
+              <a:r>
+                <a:rPr lang="en-GB" sz="1000" dirty="0" smtClean="0">
+                  <a:solidFill>
+                    <a:schemeClr val="tx1">
+                      <a:lumMod val="60000"/>
+                      <a:lumOff val="40000"/>
+                    </a:schemeClr>
+                  </a:solidFill>
+                </a:rPr>
+                <a:t>%</a:t>
+              </a:r>
+              <a:endParaRPr lang="en-GB" sz="1000" dirty="0">
+                <a:solidFill>
+                  <a:schemeClr val="tx1">
+                    <a:lumMod val="60000"/>
+                    <a:lumOff val="40000"/>
+                  </a:schemeClr>
+                </a:solidFill>
+              </a:endParaRPr>
+            </a:p>
+          </p:txBody>
+        </p:sp>
+        <p:sp>
+          <p:nvSpPr>
+            <p:cNvPr id="54" name="TextBox 53"/>
+            <p:cNvSpPr txBox="1"/>
+            <p:nvPr/>
+          </p:nvSpPr>
+          <p:spPr>
+            <a:xfrm>
+              <a:off x="1350122" y="2816553"/>
+              <a:ext cx="356188" cy="400110"/>
+            </a:xfrm>
+            <a:prstGeom prst="rect">
+              <a:avLst/>
+            </a:prstGeom>
+            <a:noFill/>
+          </p:spPr>
+          <p:txBody>
+            <a:bodyPr wrap="none" rtlCol="0">
+              <a:spAutoFit/>
+            </a:bodyPr>
+            <a:lstStyle/>
+            <a:p>
+              <a:r>
+                <a:rPr lang="en-GB" sz="2000" b="1" dirty="0" smtClean="0"/>
+                <a:t>X</a:t>
+              </a:r>
+              <a:endParaRPr lang="en-GB" sz="2000" b="1" dirty="0"/>
+            </a:p>
+          </p:txBody>
+        </p:sp>
+        <p:sp>
+          <p:nvSpPr>
+            <p:cNvPr id="55" name="TextBox 54"/>
+            <p:cNvSpPr txBox="1"/>
+            <p:nvPr/>
+          </p:nvSpPr>
+          <p:spPr>
+            <a:xfrm>
+              <a:off x="1481184" y="3016608"/>
+              <a:ext cx="764953" cy="276999"/>
+            </a:xfrm>
+            <a:prstGeom prst="rect">
+              <a:avLst/>
+            </a:prstGeom>
+            <a:noFill/>
+          </p:spPr>
+          <p:txBody>
+            <a:bodyPr wrap="none" rtlCol="0">
+              <a:spAutoFit/>
+            </a:bodyPr>
+            <a:lstStyle/>
+            <a:p>
+              <a:r>
+                <a:rPr lang="en-GB" sz="1200" dirty="0" smtClean="0"/>
+                <a:t>Breitbart</a:t>
+              </a:r>
+              <a:endParaRPr lang="en-GB" sz="1200" dirty="0"/>
+            </a:p>
+          </p:txBody>
+        </p:sp>
+        <p:sp>
+          <p:nvSpPr>
+            <p:cNvPr id="57" name="TextBox 56"/>
+            <p:cNvSpPr txBox="1"/>
+            <p:nvPr/>
+          </p:nvSpPr>
+          <p:spPr>
+            <a:xfrm>
+              <a:off x="1628235" y="2006508"/>
+              <a:ext cx="356188" cy="400110"/>
+            </a:xfrm>
+            <a:prstGeom prst="rect">
+              <a:avLst/>
+            </a:prstGeom>
+            <a:noFill/>
+          </p:spPr>
+          <p:txBody>
+            <a:bodyPr wrap="none" rtlCol="0">
+              <a:spAutoFit/>
+            </a:bodyPr>
+            <a:lstStyle/>
+            <a:p>
+              <a:r>
+                <a:rPr lang="en-GB" sz="2000" b="1" dirty="0" smtClean="0"/>
+                <a:t>X</a:t>
+              </a:r>
+              <a:endParaRPr lang="en-GB" sz="2000" b="1" dirty="0"/>
+            </a:p>
+          </p:txBody>
+        </p:sp>
+        <p:sp>
+          <p:nvSpPr>
+            <p:cNvPr id="59" name="TextBox 58"/>
+            <p:cNvSpPr txBox="1"/>
+            <p:nvPr/>
+          </p:nvSpPr>
+          <p:spPr>
+            <a:xfrm>
+              <a:off x="1759297" y="2206563"/>
+              <a:ext cx="577402" cy="276999"/>
+            </a:xfrm>
+            <a:prstGeom prst="rect">
+              <a:avLst/>
+            </a:prstGeom>
+            <a:noFill/>
+          </p:spPr>
+          <p:txBody>
+            <a:bodyPr wrap="none" rtlCol="0">
+              <a:spAutoFit/>
+            </a:bodyPr>
+            <a:lstStyle/>
+            <a:p>
+              <a:r>
+                <a:rPr lang="en-GB" sz="1200" dirty="0" smtClean="0"/>
+                <a:t>Metro</a:t>
+              </a:r>
+              <a:endParaRPr lang="en-GB" sz="1200" dirty="0"/>
+            </a:p>
+          </p:txBody>
+        </p:sp>
+        <p:sp>
+          <p:nvSpPr>
+            <p:cNvPr id="60" name="TextBox 59"/>
+            <p:cNvSpPr txBox="1"/>
+            <p:nvPr/>
+          </p:nvSpPr>
+          <p:spPr>
+            <a:xfrm>
+              <a:off x="1470209" y="2198868"/>
+              <a:ext cx="356188" cy="400110"/>
+            </a:xfrm>
+            <a:prstGeom prst="rect">
+              <a:avLst/>
+            </a:prstGeom>
+            <a:noFill/>
+          </p:spPr>
+          <p:txBody>
+            <a:bodyPr wrap="none" rtlCol="0">
+              <a:spAutoFit/>
+            </a:bodyPr>
+            <a:lstStyle/>
+            <a:p>
+              <a:r>
+                <a:rPr lang="en-GB" sz="2000" b="1" dirty="0" smtClean="0"/>
+                <a:t>X</a:t>
+              </a:r>
+              <a:endParaRPr lang="en-GB" sz="2000" b="1" dirty="0"/>
+            </a:p>
+          </p:txBody>
+        </p:sp>
+        <p:sp>
+          <p:nvSpPr>
+            <p:cNvPr id="61" name="TextBox 60"/>
+            <p:cNvSpPr txBox="1"/>
+            <p:nvPr/>
+          </p:nvSpPr>
+          <p:spPr>
+            <a:xfrm>
+              <a:off x="1601271" y="2398923"/>
+              <a:ext cx="867545" cy="276999"/>
+            </a:xfrm>
+            <a:prstGeom prst="rect">
+              <a:avLst/>
+            </a:prstGeom>
+            <a:noFill/>
+          </p:spPr>
+          <p:txBody>
+            <a:bodyPr wrap="none" rtlCol="0">
+              <a:spAutoFit/>
+            </a:bodyPr>
+            <a:lstStyle/>
+            <a:p>
+              <a:r>
+                <a:rPr lang="en-GB" sz="1200" dirty="0" smtClean="0"/>
+                <a:t>Fox News</a:t>
+              </a:r>
+              <a:endParaRPr lang="en-GB" sz="1200" dirty="0"/>
+            </a:p>
+          </p:txBody>
+        </p:sp>
+      </p:grpSp>
+      <p:pic>
+        <p:nvPicPr>
+          <p:cNvPr id="15" name="Picture 14"/>
+          <p:cNvPicPr>
+            <a:picLocks noChangeAspect="1"/>
+          </p:cNvPicPr>
+          <p:nvPr/>
+        </p:nvPicPr>
+        <p:blipFill>
+          <a:blip r:embed="rId3"/>
+          <a:stretch>
+            <a:fillRect/>
+          </a:stretch>
+        </p:blipFill>
+        <p:spPr>
+          <a:xfrm>
+            <a:off x="1657405" y="250148"/>
+            <a:ext cx="6936833" cy="914606"/>
+          </a:xfrm>
+          <a:prstGeom prst="rect">
+            <a:avLst/>
+          </a:prstGeom>
+        </p:spPr>
+      </p:pic>
+    </p:spTree>
+    <p:extLst>
+      <p:ext uri="{BB962C8B-B14F-4D97-AF65-F5344CB8AC3E}">
+        <p14:creationId xmlns:p14="http://schemas.microsoft.com/office/powerpoint/2010/main" val="807557891"/>
+      </p:ext>
+    </p:extLst>
+  </p:cSld>
+  <p:clrMapOvr>
+    <a:masterClrMapping/>
+  </p:clrMapOvr>
+  <p:timing>
+    <p:tnLst>
+      <p:par>
+        <p:cTn id="1" dur="indefinite" restart="never" nodeType="tmRoot"/>
+      </p:par>
+    </p:tnLst>
+  </p:timing>
 </p:sld>
 </file>
 

</xml_diff>